<commit_message>
Add drop_geo ablation outputs
</commit_message>
<xml_diff>
--- a/SUNUM_SLIDES.pptx
+++ b/SUNUM_SLIDES.pptx
@@ -3347,7 +3347,7 @@
           <a:p>
             <a:pPr/>
             <a:r>
-              <a:t>Neden Random Forest? -&gt; Dogrusal olmayan iliskileri yakaliyor</a:t>
+              <a:t>Neden RF? -&gt; Dogrusal olmayan iliskileri yakaliyor</a:t>
             </a:r>
           </a:p>
           <a:p>
@@ -4160,19 +4160,25 @@
           <a:p>
             <a:pPr/>
             <a:r>
-              <a:t>LinearRegression -&gt; MAE 94.83, RMSE 232.56, R2 -0.115</a:t>
+              <a:t>Full LR -&gt; MAE 94.83, RMSE 232.56, R2 -0.115</a:t>
             </a:r>
           </a:p>
           <a:p>
             <a:pPr/>
             <a:r>
-              <a:t>RandomForestRegressor -&gt; MAE 42.15, RMSE 156.90, R2 0.492</a:t>
+              <a:t>Full RF -&gt; MAE 42.15, RMSE 156.90, R2 0.492</a:t>
             </a:r>
           </a:p>
           <a:p>
             <a:pPr/>
             <a:r>
-              <a:t>Random Forest daha iyi performans verdi</a:t>
+              <a:t>No-Geo LR -&gt; MAE 74.62, RMSE 211.84, R2 0.074</a:t>
+            </a:r>
+          </a:p>
+          <a:p>
+            <a:pPr/>
+            <a:r>
+              <a:t>No-Geo RF -&gt; MAE 25.98, RMSE 116.89, R2 0.718</a:t>
             </a:r>
           </a:p>
         </p:txBody>
@@ -4520,13 +4526,13 @@
           <a:p>
             <a:pPr/>
             <a:r>
+              <a:t>No-Geo RF ile R2 0.718 seviyesine cikti</a:t>
+            </a:r>
+          </a:p>
+          <a:p>
+            <a:pPr/>
+            <a:r>
               <a:t>Karlilik iliskileri dogrusal degil; indirim ve kategori etkisi kritik</a:t>
-            </a:r>
-          </a:p>
-          <a:p>
-            <a:pPr/>
-            <a:r>
-              <a:t>15 saniyelik ozet: RF ile MAE 94'ten 42'ye dustu, R2 ~0.49</a:t>
             </a:r>
           </a:p>
         </p:txBody>
@@ -4674,6 +4680,12 @@
             <a:pPr/>
             <a:r>
               <a:t>City/Postal Code overfit riski tasiyabilir</a:t>
+            </a:r>
+          </a:p>
+          <a:p>
+            <a:pPr/>
+            <a:r>
+              <a:t>drop_geo testi geo kolonlarin gurultu olabilecegini gosterdi</a:t>
             </a:r>
           </a:p>
           <a:p>

</xml_diff>